<commit_message>
resized login page and placeholder screen
</commit_message>
<xml_diff>
--- a/KarmaPolice Text Logo 1.pptx
+++ b/KarmaPolice Text Logo 1.pptx
@@ -288,7 +288,7 @@
           <a:p>
             <a:fld id="{286F4CCE-D9C3-CA46-90DC-D68A308A4E01}" type="datetimeFigureOut">
               <a:rPr kumimoji="1" lang="zh-TW" altLang="en-US" smtClean="0"/>
-              <a:t>9/1/14</a:t>
+              <a:t>15/1/14</a:t>
             </a:fld>
             <a:endParaRPr kumimoji="1" lang="zh-TW" altLang="en-US"/>
           </a:p>
@@ -458,7 +458,7 @@
           <a:p>
             <a:fld id="{286F4CCE-D9C3-CA46-90DC-D68A308A4E01}" type="datetimeFigureOut">
               <a:rPr kumimoji="1" lang="zh-TW" altLang="en-US" smtClean="0"/>
-              <a:t>9/1/14</a:t>
+              <a:t>15/1/14</a:t>
             </a:fld>
             <a:endParaRPr kumimoji="1" lang="zh-TW" altLang="en-US"/>
           </a:p>
@@ -638,7 +638,7 @@
           <a:p>
             <a:fld id="{286F4CCE-D9C3-CA46-90DC-D68A308A4E01}" type="datetimeFigureOut">
               <a:rPr kumimoji="1" lang="zh-TW" altLang="en-US" smtClean="0"/>
-              <a:t>9/1/14</a:t>
+              <a:t>15/1/14</a:t>
             </a:fld>
             <a:endParaRPr kumimoji="1" lang="zh-TW" altLang="en-US"/>
           </a:p>
@@ -808,7 +808,7 @@
           <a:p>
             <a:fld id="{286F4CCE-D9C3-CA46-90DC-D68A308A4E01}" type="datetimeFigureOut">
               <a:rPr kumimoji="1" lang="zh-TW" altLang="en-US" smtClean="0"/>
-              <a:t>9/1/14</a:t>
+              <a:t>15/1/14</a:t>
             </a:fld>
             <a:endParaRPr kumimoji="1" lang="zh-TW" altLang="en-US"/>
           </a:p>
@@ -1054,7 +1054,7 @@
           <a:p>
             <a:fld id="{286F4CCE-D9C3-CA46-90DC-D68A308A4E01}" type="datetimeFigureOut">
               <a:rPr kumimoji="1" lang="zh-TW" altLang="en-US" smtClean="0"/>
-              <a:t>9/1/14</a:t>
+              <a:t>15/1/14</a:t>
             </a:fld>
             <a:endParaRPr kumimoji="1" lang="zh-TW" altLang="en-US"/>
           </a:p>
@@ -1342,7 +1342,7 @@
           <a:p>
             <a:fld id="{286F4CCE-D9C3-CA46-90DC-D68A308A4E01}" type="datetimeFigureOut">
               <a:rPr kumimoji="1" lang="zh-TW" altLang="en-US" smtClean="0"/>
-              <a:t>9/1/14</a:t>
+              <a:t>15/1/14</a:t>
             </a:fld>
             <a:endParaRPr kumimoji="1" lang="zh-TW" altLang="en-US"/>
           </a:p>
@@ -1764,7 +1764,7 @@
           <a:p>
             <a:fld id="{286F4CCE-D9C3-CA46-90DC-D68A308A4E01}" type="datetimeFigureOut">
               <a:rPr kumimoji="1" lang="zh-TW" altLang="en-US" smtClean="0"/>
-              <a:t>9/1/14</a:t>
+              <a:t>15/1/14</a:t>
             </a:fld>
             <a:endParaRPr kumimoji="1" lang="zh-TW" altLang="en-US"/>
           </a:p>
@@ -1882,7 +1882,7 @@
           <a:p>
             <a:fld id="{286F4CCE-D9C3-CA46-90DC-D68A308A4E01}" type="datetimeFigureOut">
               <a:rPr kumimoji="1" lang="zh-TW" altLang="en-US" smtClean="0"/>
-              <a:t>9/1/14</a:t>
+              <a:t>15/1/14</a:t>
             </a:fld>
             <a:endParaRPr kumimoji="1" lang="zh-TW" altLang="en-US"/>
           </a:p>
@@ -1977,7 +1977,7 @@
           <a:p>
             <a:fld id="{286F4CCE-D9C3-CA46-90DC-D68A308A4E01}" type="datetimeFigureOut">
               <a:rPr kumimoji="1" lang="zh-TW" altLang="en-US" smtClean="0"/>
-              <a:t>9/1/14</a:t>
+              <a:t>15/1/14</a:t>
             </a:fld>
             <a:endParaRPr kumimoji="1" lang="zh-TW" altLang="en-US"/>
           </a:p>
@@ -2254,7 +2254,7 @@
           <a:p>
             <a:fld id="{286F4CCE-D9C3-CA46-90DC-D68A308A4E01}" type="datetimeFigureOut">
               <a:rPr kumimoji="1" lang="zh-TW" altLang="en-US" smtClean="0"/>
-              <a:t>9/1/14</a:t>
+              <a:t>15/1/14</a:t>
             </a:fld>
             <a:endParaRPr kumimoji="1" lang="zh-TW" altLang="en-US"/>
           </a:p>
@@ -2507,7 +2507,7 @@
           <a:p>
             <a:fld id="{286F4CCE-D9C3-CA46-90DC-D68A308A4E01}" type="datetimeFigureOut">
               <a:rPr kumimoji="1" lang="zh-TW" altLang="en-US" smtClean="0"/>
-              <a:t>9/1/14</a:t>
+              <a:t>15/1/14</a:t>
             </a:fld>
             <a:endParaRPr kumimoji="1" lang="zh-TW" altLang="en-US"/>
           </a:p>
@@ -2720,7 +2720,7 @@
           <a:p>
             <a:fld id="{286F4CCE-D9C3-CA46-90DC-D68A308A4E01}" type="datetimeFigureOut">
               <a:rPr kumimoji="1" lang="zh-TW" altLang="en-US" smtClean="0"/>
-              <a:t>9/1/14</a:t>
+              <a:t>15/1/14</a:t>
             </a:fld>
             <a:endParaRPr kumimoji="1" lang="zh-TW" altLang="en-US"/>
           </a:p>
@@ -3110,9 +3110,7 @@
             <a:off x="678964" y="407674"/>
             <a:ext cx="7217128" cy="1470025"/>
           </a:xfrm>
-          <a:solidFill>
-            <a:srgbClr val="04FFCC"/>
-          </a:solidFill>
+          <a:noFill/>
         </p:spPr>
         <p:txBody>
           <a:bodyPr>

</xml_diff>